<commit_message>
Update BUILD YOUR FIRST MACHINE LEARNING MODEL WITH SCIKIT.pptx
Updated with Amazon email address and title
</commit_message>
<xml_diff>
--- a/BUILD YOUR FIRST MACHINE LEARNING MODEL WITH SCIKIT.pptx
+++ b/BUILD YOUR FIRST MACHINE LEARNING MODEL WITH SCIKIT.pptx
@@ -352,7 +352,7 @@
           <a:p>
             <a:fld id="{7499BAB8-CB93-436E-BB3A-EDA0384D9FE3}" type="datetimeFigureOut">
               <a:rPr lang="en-CA" smtClean="0"/>
-              <a:t>2019-11-08</a:t>
+              <a:t>2020-07-12</a:t>
             </a:fld>
             <a:endParaRPr lang="en-CA"/>
           </a:p>
@@ -560,7 +560,7 @@
           <a:p>
             <a:fld id="{7499BAB8-CB93-436E-BB3A-EDA0384D9FE3}" type="datetimeFigureOut">
               <a:rPr lang="en-CA" smtClean="0"/>
-              <a:t>2019-11-08</a:t>
+              <a:t>2020-07-12</a:t>
             </a:fld>
             <a:endParaRPr lang="en-CA"/>
           </a:p>
@@ -816,7 +816,7 @@
           <a:p>
             <a:fld id="{7499BAB8-CB93-436E-BB3A-EDA0384D9FE3}" type="datetimeFigureOut">
               <a:rPr lang="en-CA" smtClean="0"/>
-              <a:t>2019-11-08</a:t>
+              <a:t>2020-07-12</a:t>
             </a:fld>
             <a:endParaRPr lang="en-CA"/>
           </a:p>
@@ -986,7 +986,7 @@
           <a:p>
             <a:fld id="{7499BAB8-CB93-436E-BB3A-EDA0384D9FE3}" type="datetimeFigureOut">
               <a:rPr lang="en-CA" smtClean="0"/>
-              <a:t>2019-11-08</a:t>
+              <a:t>2020-07-12</a:t>
             </a:fld>
             <a:endParaRPr lang="en-CA"/>
           </a:p>
@@ -1329,7 +1329,7 @@
           <a:p>
             <a:fld id="{7499BAB8-CB93-436E-BB3A-EDA0384D9FE3}" type="datetimeFigureOut">
               <a:rPr lang="en-CA" smtClean="0"/>
-              <a:t>2019-11-08</a:t>
+              <a:t>2020-07-12</a:t>
             </a:fld>
             <a:endParaRPr lang="en-CA"/>
           </a:p>
@@ -1604,7 +1604,7 @@
           <a:p>
             <a:fld id="{7499BAB8-CB93-436E-BB3A-EDA0384D9FE3}" type="datetimeFigureOut">
               <a:rPr lang="en-CA" smtClean="0"/>
-              <a:t>2019-11-08</a:t>
+              <a:t>2020-07-12</a:t>
             </a:fld>
             <a:endParaRPr lang="en-CA"/>
           </a:p>
@@ -1983,7 +1983,7 @@
           <a:p>
             <a:fld id="{7499BAB8-CB93-436E-BB3A-EDA0384D9FE3}" type="datetimeFigureOut">
               <a:rPr lang="en-CA" smtClean="0"/>
-              <a:t>2019-11-08</a:t>
+              <a:t>2020-07-12</a:t>
             </a:fld>
             <a:endParaRPr lang="en-CA"/>
           </a:p>
@@ -2101,7 +2101,7 @@
           <a:p>
             <a:fld id="{7499BAB8-CB93-436E-BB3A-EDA0384D9FE3}" type="datetimeFigureOut">
               <a:rPr lang="en-CA" smtClean="0"/>
-              <a:t>2019-11-08</a:t>
+              <a:t>2020-07-12</a:t>
             </a:fld>
             <a:endParaRPr lang="en-CA"/>
           </a:p>
@@ -2272,7 +2272,7 @@
           <a:p>
             <a:fld id="{7499BAB8-CB93-436E-BB3A-EDA0384D9FE3}" type="datetimeFigureOut">
               <a:rPr lang="en-CA" smtClean="0"/>
-              <a:t>2019-11-08</a:t>
+              <a:t>2020-07-12</a:t>
             </a:fld>
             <a:endParaRPr lang="en-CA"/>
           </a:p>
@@ -2626,7 +2626,7 @@
           <a:p>
             <a:fld id="{7499BAB8-CB93-436E-BB3A-EDA0384D9FE3}" type="datetimeFigureOut">
               <a:rPr lang="en-CA" smtClean="0"/>
-              <a:t>2019-11-08</a:t>
+              <a:t>2020-07-12</a:t>
             </a:fld>
             <a:endParaRPr lang="en-CA"/>
           </a:p>
@@ -3003,7 +3003,7 @@
           <a:p>
             <a:fld id="{7499BAB8-CB93-436E-BB3A-EDA0384D9FE3}" type="datetimeFigureOut">
               <a:rPr lang="en-CA" smtClean="0"/>
-              <a:t>2019-11-08</a:t>
+              <a:t>2020-07-12</a:t>
             </a:fld>
             <a:endParaRPr lang="en-CA"/>
           </a:p>
@@ -3290,7 +3290,7 @@
           <a:p>
             <a:fld id="{7499BAB8-CB93-436E-BB3A-EDA0384D9FE3}" type="datetimeFigureOut">
               <a:rPr lang="en-CA" smtClean="0"/>
-              <a:t>2019-11-08</a:t>
+              <a:t>2020-07-12</a:t>
             </a:fld>
             <a:endParaRPr lang="en-CA"/>
           </a:p>
@@ -3877,20 +3877,18 @@
           <a:p>
             <a:r>
               <a:rPr lang="en-CA" dirty="0"/>
-              <a:t>Susan IBACH</a:t>
+              <a:t>Susan IBACH – Amazon Future engineer program lead, </a:t>
+            </a:r>
+            <a:r>
+              <a:rPr lang="en-CA" dirty="0" err="1"/>
+              <a:t>canada</a:t>
             </a:r>
             <a:br>
               <a:rPr lang="en-CA" dirty="0"/>
             </a:br>
             <a:r>
-              <a:rPr lang="en-CA" dirty="0">
-                <a:hlinkClick r:id="rId2"/>
-              </a:rPr>
-              <a:t>SUSAN.IBACH@LIVE.COM</a:t>
-            </a:r>
-            <a:r>
               <a:rPr lang="en-CA" dirty="0"/>
-              <a:t> </a:t>
+              <a:t>ibacsusa@amazon.com</a:t>
             </a:r>
           </a:p>
           <a:p>
@@ -6158,20 +6156,18 @@
           <a:p>
             <a:r>
               <a:rPr lang="en-CA" dirty="0"/>
-              <a:t>Susan IBACH</a:t>
+              <a:t>Susan IBACH Amazon future engineer program lead, </a:t>
+            </a:r>
+            <a:r>
+              <a:rPr lang="en-CA" dirty="0" err="1"/>
+              <a:t>canada</a:t>
             </a:r>
             <a:br>
               <a:rPr lang="en-CA" dirty="0"/>
             </a:br>
             <a:r>
-              <a:rPr lang="en-CA" dirty="0">
-                <a:hlinkClick r:id="rId2"/>
-              </a:rPr>
-              <a:t>SUSAN.IBACH@LIVE.COM</a:t>
-            </a:r>
-            <a:r>
               <a:rPr lang="en-CA" dirty="0"/>
-              <a:t> </a:t>
+              <a:t>ibacsusa@amazon.com</a:t>
             </a:r>
           </a:p>
           <a:p>

</xml_diff>